<commit_message>
calculated sigma * beta_soc
</commit_message>
<xml_diff>
--- a/ProjectDocs/ProgressReport2.pptx
+++ b/ProjectDocs/ProgressReport2.pptx
@@ -109,6 +109,11 @@
       </a:defRPr>
     </a:lvl9pPr>
   </p:defaultTextStyle>
+  <p:extLst>
+    <p:ext uri="{EFAFB233-063F-42B5-8137-9DF3F51BA10A}">
+      <p15:sldGuideLst xmlns:p15="http://schemas.microsoft.com/office/powerpoint/2012/main"/>
+    </p:ext>
+  </p:extLst>
 </p:presentation>
 </file>
 
@@ -834,7 +839,7 @@
           <a:p>
             <a:fld id="{092F3FE2-AC6D-4AC2-975C-8A2F5A3B9803}" type="datetimeFigureOut">
               <a:rPr lang="en-US" smtClean="0"/>
-              <a:t>3/4/2020</a:t>
+              <a:t>3/5/2020</a:t>
             </a:fld>
             <a:endParaRPr lang="en-US"/>
           </a:p>
@@ -1085,7 +1090,7 @@
           <a:p>
             <a:fld id="{092F3FE2-AC6D-4AC2-975C-8A2F5A3B9803}" type="datetimeFigureOut">
               <a:rPr lang="en-US" smtClean="0"/>
-              <a:t>3/4/2020</a:t>
+              <a:t>3/5/2020</a:t>
             </a:fld>
             <a:endParaRPr lang="en-US"/>
           </a:p>
@@ -1399,7 +1404,7 @@
           <a:p>
             <a:fld id="{092F3FE2-AC6D-4AC2-975C-8A2F5A3B9803}" type="datetimeFigureOut">
               <a:rPr lang="en-US" smtClean="0"/>
-              <a:t>3/4/2020</a:t>
+              <a:t>3/5/2020</a:t>
             </a:fld>
             <a:endParaRPr lang="en-US"/>
           </a:p>
@@ -1740,7 +1745,7 @@
           <a:p>
             <a:fld id="{092F3FE2-AC6D-4AC2-975C-8A2F5A3B9803}" type="datetimeFigureOut">
               <a:rPr lang="en-US" smtClean="0"/>
-              <a:t>3/4/2020</a:t>
+              <a:t>3/5/2020</a:t>
             </a:fld>
             <a:endParaRPr lang="en-US"/>
           </a:p>
@@ -2054,7 +2059,7 @@
           <a:p>
             <a:fld id="{092F3FE2-AC6D-4AC2-975C-8A2F5A3B9803}" type="datetimeFigureOut">
               <a:rPr lang="en-US" smtClean="0"/>
-              <a:t>3/4/2020</a:t>
+              <a:t>3/5/2020</a:t>
             </a:fld>
             <a:endParaRPr lang="en-US"/>
           </a:p>
@@ -2447,7 +2452,7 @@
           <a:p>
             <a:fld id="{092F3FE2-AC6D-4AC2-975C-8A2F5A3B9803}" type="datetimeFigureOut">
               <a:rPr lang="en-US" smtClean="0"/>
-              <a:t>3/4/2020</a:t>
+              <a:t>3/5/2020</a:t>
             </a:fld>
             <a:endParaRPr lang="en-US"/>
           </a:p>
@@ -2617,7 +2622,7 @@
           <a:p>
             <a:fld id="{092F3FE2-AC6D-4AC2-975C-8A2F5A3B9803}" type="datetimeFigureOut">
               <a:rPr lang="en-US" smtClean="0"/>
-              <a:t>3/4/2020</a:t>
+              <a:t>3/5/2020</a:t>
             </a:fld>
             <a:endParaRPr lang="en-US"/>
           </a:p>
@@ -2797,7 +2802,7 @@
           <a:p>
             <a:fld id="{092F3FE2-AC6D-4AC2-975C-8A2F5A3B9803}" type="datetimeFigureOut">
               <a:rPr lang="en-US" smtClean="0"/>
-              <a:t>3/4/2020</a:t>
+              <a:t>3/5/2020</a:t>
             </a:fld>
             <a:endParaRPr lang="en-US"/>
           </a:p>
@@ -2973,7 +2978,7 @@
           <a:p>
             <a:fld id="{092F3FE2-AC6D-4AC2-975C-8A2F5A3B9803}" type="datetimeFigureOut">
               <a:rPr lang="en-US" smtClean="0"/>
-              <a:t>3/4/2020</a:t>
+              <a:t>3/5/2020</a:t>
             </a:fld>
             <a:endParaRPr lang="en-US"/>
           </a:p>
@@ -3220,7 +3225,7 @@
           <a:p>
             <a:fld id="{092F3FE2-AC6D-4AC2-975C-8A2F5A3B9803}" type="datetimeFigureOut">
               <a:rPr lang="en-US" smtClean="0"/>
-              <a:t>3/4/2020</a:t>
+              <a:t>3/5/2020</a:t>
             </a:fld>
             <a:endParaRPr lang="en-US"/>
           </a:p>
@@ -3452,7 +3457,7 @@
           <a:p>
             <a:fld id="{092F3FE2-AC6D-4AC2-975C-8A2F5A3B9803}" type="datetimeFigureOut">
               <a:rPr lang="en-US" smtClean="0"/>
-              <a:t>3/4/2020</a:t>
+              <a:t>3/5/2020</a:t>
             </a:fld>
             <a:endParaRPr lang="en-US"/>
           </a:p>
@@ -3826,7 +3831,7 @@
           <a:p>
             <a:fld id="{092F3FE2-AC6D-4AC2-975C-8A2F5A3B9803}" type="datetimeFigureOut">
               <a:rPr lang="en-US" smtClean="0"/>
-              <a:t>3/4/2020</a:t>
+              <a:t>3/5/2020</a:t>
             </a:fld>
             <a:endParaRPr lang="en-US"/>
           </a:p>
@@ -3949,7 +3954,7 @@
           <a:p>
             <a:fld id="{092F3FE2-AC6D-4AC2-975C-8A2F5A3B9803}" type="datetimeFigureOut">
               <a:rPr lang="en-US" smtClean="0"/>
-              <a:t>3/4/2020</a:t>
+              <a:t>3/5/2020</a:t>
             </a:fld>
             <a:endParaRPr lang="en-US"/>
           </a:p>
@@ -4044,7 +4049,7 @@
           <a:p>
             <a:fld id="{092F3FE2-AC6D-4AC2-975C-8A2F5A3B9803}" type="datetimeFigureOut">
               <a:rPr lang="en-US" smtClean="0"/>
-              <a:t>3/4/2020</a:t>
+              <a:t>3/5/2020</a:t>
             </a:fld>
             <a:endParaRPr lang="en-US"/>
           </a:p>
@@ -4299,7 +4304,7 @@
           <a:p>
             <a:fld id="{092F3FE2-AC6D-4AC2-975C-8A2F5A3B9803}" type="datetimeFigureOut">
               <a:rPr lang="en-US" smtClean="0"/>
-              <a:t>3/4/2020</a:t>
+              <a:t>3/5/2020</a:t>
             </a:fld>
             <a:endParaRPr lang="en-US"/>
           </a:p>
@@ -4562,7 +4567,7 @@
           <a:p>
             <a:fld id="{092F3FE2-AC6D-4AC2-975C-8A2F5A3B9803}" type="datetimeFigureOut">
               <a:rPr lang="en-US" smtClean="0"/>
-              <a:t>3/4/2020</a:t>
+              <a:t>3/5/2020</a:t>
             </a:fld>
             <a:endParaRPr lang="en-US"/>
           </a:p>
@@ -5305,7 +5310,7 @@
           <a:p>
             <a:fld id="{092F3FE2-AC6D-4AC2-975C-8A2F5A3B9803}" type="datetimeFigureOut">
               <a:rPr lang="en-US" smtClean="0"/>
-              <a:t>3/4/2020</a:t>
+              <a:t>3/5/2020</a:t>
             </a:fld>
             <a:endParaRPr lang="en-US"/>
           </a:p>
@@ -5972,7 +5977,12 @@
             <p:ph idx="1"/>
           </p:nvPr>
         </p:nvSpPr>
-        <p:spPr/>
+        <p:spPr>
+          <a:xfrm>
+            <a:off x="677334" y="1585553"/>
+            <a:ext cx="8596668" cy="3880773"/>
+          </a:xfrm>
+        </p:spPr>
         <p:txBody>
           <a:bodyPr/>
           <a:lstStyle/>
@@ -6049,13 +6059,13 @@
   <p:clrMapOvr>
     <a:masterClrMapping/>
   </p:clrMapOvr>
-  <mc:AlternateContent xmlns:mc="http://schemas.openxmlformats.org/markup-compatibility/2006">
-    <mc:Choice xmlns:p14="http://schemas.microsoft.com/office/powerpoint/2010/main" Requires="p14">
+  <mc:AlternateContent xmlns:mc="http://schemas.openxmlformats.org/markup-compatibility/2006" xmlns:p14="http://schemas.microsoft.com/office/powerpoint/2010/main">
+    <mc:Choice Requires="p14">
       <p:transition spd="med" p14:dur="700">
         <p:fade/>
       </p:transition>
     </mc:Choice>
-    <mc:Fallback>
+    <mc:Fallback xmlns="">
       <p:transition spd="med">
         <p:fade/>
       </p:transition>
@@ -6263,13 +6273,13 @@
   <p:clrMapOvr>
     <a:masterClrMapping/>
   </p:clrMapOvr>
-  <mc:AlternateContent xmlns:mc="http://schemas.openxmlformats.org/markup-compatibility/2006">
-    <mc:Choice xmlns:p159="http://schemas.microsoft.com/office/powerpoint/2015/09/main" Requires="p159">
+  <mc:AlternateContent xmlns:mc="http://schemas.openxmlformats.org/markup-compatibility/2006" xmlns:p159="http://schemas.microsoft.com/office/powerpoint/2015/09/main">
+    <mc:Choice Requires="p159">
       <p:transition xmlns:p14="http://schemas.microsoft.com/office/powerpoint/2010/main" spd="slow" p14:dur="2000">
         <p159:morph option="byObject"/>
       </p:transition>
     </mc:Choice>
-    <mc:Fallback>
+    <mc:Fallback xmlns="">
       <p:transition spd="slow">
         <p:fade/>
       </p:transition>
@@ -6367,20 +6377,22 @@
             <a:pPr lvl="1"/>
             <a:r>
               <a:rPr lang="en-US" dirty="0"/>
-              <a:t>Calculating statistical errors (root-mean square errors) and reporting relevant statistics (means, standard deviations, etc.)</a:t>
+              <a:t>Calculating statistical errors (root-mean square errors) and reporting relevant statistics (means, standard deviations, </a:t>
+            </a:r>
+            <a:r>
+              <a:rPr lang="en-US"/>
+              <a:t>etc.)</a:t>
             </a:r>
           </a:p>
           <a:p>
             <a:pPr lvl="1"/>
             <a:r>
+              <a:rPr lang="en-US"/>
+              <a:t>Back-end </a:t>
+            </a:r>
+            <a:r>
               <a:rPr lang="en-US" dirty="0"/>
-              <a:t>The team will work on the back end and user interface in parallel. Once both are mostly completed, several user testing sessions will take place, using the existing pilot testing script. Then the team will make a poster for UMCUR.</a:t>
-            </a:r>
-          </a:p>
-          <a:p>
-            <a:r>
-              <a:rPr lang="en-US" dirty="0"/>
-              <a:t>Back-end and user interface design in parallel</a:t>
+              <a:t>and user interface design in parallel</a:t>
             </a:r>
           </a:p>
         </p:txBody>

</xml_diff>